<commit_message>
1c - Figure 6. Update axes titles
Decreased Agriculture instead of Ag to Urban conversion
Updated methods ppt
</commit_message>
<xml_diff>
--- a/BottomUpVulnerabilityMethod.pptx
+++ b/BottomUpVulnerabilityMethod.pptx
@@ -3997,7 +3997,7 @@
         </p:nvSpPr>
         <p:spPr>
           <a:xfrm>
-            <a:off x="2902627" y="1215767"/>
+            <a:off x="2842549" y="1215767"/>
             <a:ext cx="2258461" cy="2333972"/>
           </a:xfrm>
           <a:prstGeom prst="rect">
@@ -4164,8 +4164,8 @@
         </p:nvSpPr>
         <p:spPr>
           <a:xfrm>
-            <a:off x="5222597" y="1215767"/>
-            <a:ext cx="2357826" cy="2333972"/>
+            <a:off x="5177274" y="1215767"/>
+            <a:ext cx="2403149" cy="2333972"/>
           </a:xfrm>
           <a:prstGeom prst="rect">
             <a:avLst/>
@@ -4206,7 +4206,7 @@
             </a:endParaRPr>
           </a:p>
           <a:p>
-            <a:pPr marL="457200" indent="-228600">
+            <a:pPr marL="284163" indent="-171450">
               <a:buFont typeface="Arial" panose="020B0604020202020204" pitchFamily="34" charset="0"/>
               <a:buChar char="•"/>
             </a:pPr>
@@ -4219,11 +4219,11 @@
                 </a:solidFill>
                 <a:latin typeface="Comic Sans MS" panose="030F0702030302020204" pitchFamily="66" charset="0"/>
               </a:rPr>
-              <a:t>Per capita use</a:t>
-            </a:r>
-          </a:p>
-          <a:p>
-            <a:pPr marL="457200" indent="-228600">
+              <a:t>Per capita use (6)</a:t>
+            </a:r>
+          </a:p>
+          <a:p>
+            <a:pPr marL="284163" indent="-171450">
               <a:buFont typeface="Arial" panose="020B0604020202020204" pitchFamily="34" charset="0"/>
               <a:buChar char="•"/>
             </a:pPr>
@@ -4236,11 +4236,11 @@
                 </a:solidFill>
                 <a:latin typeface="Comic Sans MS" panose="030F0702030302020204" pitchFamily="66" charset="0"/>
               </a:rPr>
-              <a:t>Population,</a:t>
-            </a:r>
-          </a:p>
-          <a:p>
-            <a:pPr marL="457200" indent="-228600">
+              <a:t>Population (3)</a:t>
+            </a:r>
+          </a:p>
+          <a:p>
+            <a:pPr marL="284163" indent="-171450">
               <a:buFont typeface="Arial" panose="020B0604020202020204" pitchFamily="34" charset="0"/>
               <a:buChar char="•"/>
             </a:pPr>
@@ -4253,11 +4253,11 @@
                 </a:solidFill>
                 <a:latin typeface="Comic Sans MS" panose="030F0702030302020204" pitchFamily="66" charset="0"/>
               </a:rPr>
-              <a:t>Ag. Conversion</a:t>
-            </a:r>
-          </a:p>
-          <a:p>
-            <a:pPr marL="457200" indent="-228600">
+              <a:t>Decreased Ag. (3)</a:t>
+            </a:r>
+          </a:p>
+          <a:p>
+            <a:pPr marL="284163" indent="-171450">
               <a:buFont typeface="Arial" panose="020B0604020202020204" pitchFamily="34" charset="0"/>
               <a:buChar char="•"/>
             </a:pPr>
@@ -4270,7 +4270,7 @@
                 </a:solidFill>
                 <a:latin typeface="Comic Sans MS" panose="030F0702030302020204" pitchFamily="66" charset="0"/>
               </a:rPr>
-              <a:t>Potential ET</a:t>
+              <a:t>Potential ET (7)</a:t>
             </a:r>
           </a:p>
           <a:p>
@@ -4293,7 +4293,7 @@
                 </a:solidFill>
                 <a:latin typeface="Comic Sans MS" panose="030F0702030302020204" pitchFamily="66" charset="0"/>
               </a:rPr>
-              <a:t>6 values</a:t>
+              <a:t>6 scenarios</a:t>
             </a:r>
           </a:p>
           <a:p>
@@ -4468,7 +4468,7 @@
                 </a:solidFill>
                 <a:latin typeface="Comic Sans MS" panose="030F0702030302020204" pitchFamily="66" charset="0"/>
               </a:rPr>
-              <a:t>3 values</a:t>
+              <a:t>3 scenarios</a:t>
             </a:r>
           </a:p>
           <a:p>
@@ -4609,14 +4609,20 @@
           <a:p>
             <a:pPr algn="ctr"/>
             <a:r>
-              <a:rPr lang="en-US" dirty="0">
+              <a:rPr lang="en-US">
                 <a:solidFill>
                   <a:srgbClr val="542708"/>
                 </a:solidFill>
                 <a:latin typeface="Comic Sans MS" panose="030F0702030302020204" pitchFamily="66" charset="0"/>
               </a:rPr>
-              <a:t>3 values</a:t>
-            </a:r>
+              <a:t>3 scenarios</a:t>
+            </a:r>
+            <a:endParaRPr lang="en-US" dirty="0">
+              <a:solidFill>
+                <a:srgbClr val="542708"/>
+              </a:solidFill>
+              <a:latin typeface="Comic Sans MS" panose="030F0702030302020204" pitchFamily="66" charset="0"/>
+            </a:endParaRPr>
           </a:p>
           <a:p>
             <a:pPr algn="ctr"/>

</xml_diff>